<commit_message>
Fixed presentation. Methodology slide
</commit_message>
<xml_diff>
--- a/MOVIE RECOMMENDER SYSTEMS.pptx
+++ b/MOVIE RECOMMENDER SYSTEMS.pptx
@@ -126,7 +126,7 @@
 <file path=ppt/revisionInfo.xml><?xml version="1.0" encoding="utf-8"?>
 <p1510:revInfo xmlns:a="http://schemas.openxmlformats.org/drawingml/2006/main" xmlns:r="http://schemas.openxmlformats.org/officeDocument/2006/relationships" xmlns:p1510="http://schemas.microsoft.com/office/powerpoint/2015/10/main">
   <p1510:revLst>
-    <p1510:client id="{F551F2DC-AC6C-422D-BAEF-DE45E645DA45}" v="2358" dt="2020-11-26T04:25:35.686"/>
+    <p1510:client id="{F551F2DC-AC6C-422D-BAEF-DE45E645DA45}" v="2365" dt="2020-11-26T17:04:35.370"/>
   </p1510:revLst>
 </p1510:revInfo>
 </file>
@@ -34777,7 +34777,7 @@
           <a:p>
             <a:fld id="{EA0C0817-A112-4847-8014-A94B7D2A4EA3}" type="datetime1">
               <a:rPr lang="en-US" smtClean="0"/>
-              <a:t>11/25/2020</a:t>
+              <a:t>11/26/2020</a:t>
             </a:fld>
             <a:endParaRPr lang="en-US" dirty="0"/>
           </a:p>
@@ -34979,7 +34979,7 @@
           <a:p>
             <a:fld id="{7332B432-ACDA-4023-A761-2BAB76577B62}" type="datetime1">
               <a:rPr lang="en-US" smtClean="0"/>
-              <a:t>11/25/2020</a:t>
+              <a:t>11/26/2020</a:t>
             </a:fld>
             <a:endParaRPr lang="en-US" dirty="0"/>
           </a:p>
@@ -35578,7 +35578,7 @@
           <a:p>
             <a:fld id="{D9C646AA-F36E-4540-911D-FFFC0A0EF24A}" type="datetime1">
               <a:rPr lang="en-US" smtClean="0"/>
-              <a:t>11/25/2020</a:t>
+              <a:t>11/26/2020</a:t>
             </a:fld>
             <a:endParaRPr lang="en-US" dirty="0"/>
           </a:p>
@@ -35898,7 +35898,7 @@
           <a:p>
             <a:fld id="{69186D26-FA5F-4637-B602-B7C2DC34CFD4}" type="datetime1">
               <a:rPr lang="en-US" smtClean="0"/>
-              <a:t>11/25/2020</a:t>
+              <a:t>11/26/2020</a:t>
             </a:fld>
             <a:endParaRPr lang="en-US" dirty="0"/>
           </a:p>
@@ -36335,7 +36335,7 @@
           <a:p>
             <a:fld id="{8A7F15D8-96D1-4781-BC50-CA8A088B2FE4}" type="datetime1">
               <a:rPr lang="en-US" smtClean="0"/>
-              <a:t>11/25/2020</a:t>
+              <a:t>11/26/2020</a:t>
             </a:fld>
             <a:endParaRPr lang="en-US" dirty="0"/>
           </a:p>
@@ -36453,7 +36453,7 @@
           <a:p>
             <a:fld id="{F9A96C99-B8F8-4528-BD05-0E16E943DC09}" type="datetime1">
               <a:rPr lang="en-US" smtClean="0"/>
-              <a:t>11/25/2020</a:t>
+              <a:t>11/26/2020</a:t>
             </a:fld>
             <a:endParaRPr lang="en-US" dirty="0"/>
           </a:p>
@@ -36548,7 +36548,7 @@
           <a:p>
             <a:fld id="{03636942-C211-4B28-8DBD-C953E00AF71B}" type="datetime1">
               <a:rPr lang="en-US" smtClean="0"/>
-              <a:t>11/25/2020</a:t>
+              <a:t>11/26/2020</a:t>
             </a:fld>
             <a:endParaRPr lang="en-US" dirty="0"/>
           </a:p>
@@ -36965,7 +36965,7 @@
           <a:p>
             <a:fld id="{7E8D12A6-918A-48BD-8CB9-CA713993B0EA}" type="datetime1">
               <a:rPr lang="en-US" smtClean="0"/>
-              <a:t>11/25/2020</a:t>
+              <a:t>11/26/2020</a:t>
             </a:fld>
             <a:endParaRPr lang="en-US" dirty="0"/>
           </a:p>
@@ -37227,7 +37227,7 @@
             <a:fld id="{E778CE86-875F-4587-BCF6-FA054AFC0D53}" type="datetime1">
               <a:rPr lang="en-US" smtClean="0"/>
               <a:pPr/>
-              <a:t>11/25/2020</a:t>
+              <a:t>11/26/2020</a:t>
             </a:fld>
             <a:endParaRPr lang="en-US" dirty="0"/>
           </a:p>
@@ -37743,7 +37743,7 @@
           <a:p>
             <a:fld id="{F6FA2B21-3FCD-4721-B95C-427943F61125}" type="datetime1">
               <a:rPr lang="en-US" smtClean="0"/>
-              <a:t>11/25/2020</a:t>
+              <a:t>11/26/2020</a:t>
             </a:fld>
             <a:endParaRPr lang="en-US" dirty="0"/>
           </a:p>
@@ -40920,7 +40920,7 @@
           <p:nvPr>
             <p:extLst>
               <p:ext uri="{D42A27DB-BD31-4B8C-83A1-F6EECF244321}">
-                <p14:modId xmlns:p14="http://schemas.microsoft.com/office/powerpoint/2010/main" val="1436865499"/>
+                <p14:modId xmlns:p14="http://schemas.microsoft.com/office/powerpoint/2010/main" val="2454789212"/>
               </p:ext>
             </p:extLst>
           </p:nvPr>
@@ -40990,13 +40990,25 @@
                     <a:p>
                       <a:pPr algn="ctr"/>
                       <a:r>
-                        <a:rPr lang="en-US" sz="1200" dirty="0"/>
+                        <a:rPr lang="en-US" sz="1200" dirty="0">
+                          <a:solidFill>
+                            <a:schemeClr val="tx1"/>
+                          </a:solidFill>
+                        </a:rPr>
                         <a:t>Bank Job</a:t>
                       </a:r>
-                      <a:endParaRPr lang="en-CA" sz="1200" dirty="0"/>
+                      <a:endParaRPr lang="en-CA" sz="1200" dirty="0">
+                        <a:solidFill>
+                          <a:schemeClr val="tx1"/>
+                        </a:solidFill>
+                      </a:endParaRPr>
                     </a:p>
                   </a:txBody>
-                  <a:tcPr/>
+                  <a:tcPr>
+                    <a:solidFill>
+                      <a:srgbClr val="FFC000"/>
+                    </a:solidFill>
+                  </a:tcPr>
                 </a:tc>
                 <a:tc>
                   <a:txBody>
@@ -41020,13 +41032,25 @@
                     <a:p>
                       <a:pPr algn="ctr"/>
                       <a:r>
-                        <a:rPr lang="en-US" sz="1200" dirty="0"/>
+                        <a:rPr lang="en-US" sz="1200" dirty="0">
+                          <a:solidFill>
+                            <a:schemeClr val="tx1"/>
+                          </a:solidFill>
+                        </a:rPr>
                         <a:t>The Godfather</a:t>
                       </a:r>
-                      <a:endParaRPr lang="en-CA" sz="1200" dirty="0"/>
+                      <a:endParaRPr lang="en-CA" sz="1200" dirty="0">
+                        <a:solidFill>
+                          <a:schemeClr val="tx1"/>
+                        </a:solidFill>
+                      </a:endParaRPr>
                     </a:p>
                   </a:txBody>
-                  <a:tcPr/>
+                  <a:tcPr>
+                    <a:solidFill>
+                      <a:srgbClr val="FFC000"/>
+                    </a:solidFill>
+                  </a:tcPr>
                 </a:tc>
                 <a:tc>
                   <a:txBody>
@@ -41062,7 +41086,11 @@
                       <a:endParaRPr lang="en-CA" dirty="0"/>
                     </a:p>
                   </a:txBody>
-                  <a:tcPr/>
+                  <a:tcPr>
+                    <a:solidFill>
+                      <a:srgbClr val="FFC000"/>
+                    </a:solidFill>
+                  </a:tcPr>
                 </a:tc>
                 <a:tc>
                   <a:txBody>
@@ -41077,7 +41105,11 @@
                       <a:endParaRPr lang="en-CA" dirty="0"/>
                     </a:p>
                   </a:txBody>
-                  <a:tcPr/>
+                  <a:tcPr>
+                    <a:solidFill>
+                      <a:srgbClr val="FFC000"/>
+                    </a:solidFill>
+                  </a:tcPr>
                 </a:tc>
                 <a:tc>
                   <a:txBody>
@@ -41092,7 +41124,11 @@
                       <a:endParaRPr lang="en-CA" dirty="0"/>
                     </a:p>
                   </a:txBody>
-                  <a:tcPr/>
+                  <a:tcPr>
+                    <a:solidFill>
+                      <a:srgbClr val="FFC000"/>
+                    </a:solidFill>
+                  </a:tcPr>
                 </a:tc>
                 <a:tc>
                   <a:txBody>
@@ -41107,7 +41143,11 @@
                       <a:endParaRPr lang="en-CA" dirty="0"/>
                     </a:p>
                   </a:txBody>
-                  <a:tcPr/>
+                  <a:tcPr>
+                    <a:solidFill>
+                      <a:srgbClr val="FFC000"/>
+                    </a:solidFill>
+                  </a:tcPr>
                 </a:tc>
                 <a:tc>
                   <a:txBody>
@@ -41117,12 +41157,16 @@
                       <a:pPr algn="ctr"/>
                       <a:r>
                         <a:rPr lang="en-US" dirty="0"/>
-                        <a:t>?</a:t>
+                        <a:t>4</a:t>
                       </a:r>
                       <a:endParaRPr lang="en-CA" dirty="0"/>
                     </a:p>
                   </a:txBody>
-                  <a:tcPr/>
+                  <a:tcPr>
+                    <a:solidFill>
+                      <a:srgbClr val="FFC000"/>
+                    </a:solidFill>
+                  </a:tcPr>
                 </a:tc>
                 <a:extLst>
                   <a:ext uri="{0D108BD9-81ED-4DB2-BD59-A6C34878D82A}">
@@ -41153,93 +41197,16 @@
                       <a:pPr algn="ctr"/>
                       <a:r>
                         <a:rPr lang="en-US" dirty="0"/>
-                        <a:t>2</a:t>
-                      </a:r>
-                      <a:endParaRPr lang="en-CA" dirty="0"/>
-                    </a:p>
-                  </a:txBody>
-                  <a:tcPr/>
-                </a:tc>
-                <a:tc>
-                  <a:txBody>
-                    <a:bodyPr/>
-                    <a:lstStyle/>
-                    <a:p>
-                      <a:pPr algn="ctr"/>
-                      <a:r>
-                        <a:rPr lang="en-US" dirty="0"/>
-                        <a:t>?</a:t>
-                      </a:r>
-                      <a:endParaRPr lang="en-CA" dirty="0"/>
-                    </a:p>
-                  </a:txBody>
-                  <a:tcPr/>
-                </a:tc>
-                <a:tc>
-                  <a:txBody>
-                    <a:bodyPr/>
-                    <a:lstStyle/>
-                    <a:p>
-                      <a:pPr algn="ctr"/>
-                      <a:r>
-                        <a:rPr lang="en-US" dirty="0"/>
                         <a:t>3</a:t>
                       </a:r>
                       <a:endParaRPr lang="en-CA" dirty="0"/>
                     </a:p>
                   </a:txBody>
-                  <a:tcPr/>
-                </a:tc>
-                <a:tc>
-                  <a:txBody>
-                    <a:bodyPr/>
-                    <a:lstStyle/>
-                    <a:p>
-                      <a:pPr algn="ctr"/>
-                      <a:r>
-                        <a:rPr lang="en-US" dirty="0"/>
-                        <a:t>?</a:t>
-                      </a:r>
-                      <a:endParaRPr lang="en-CA" dirty="0"/>
-                    </a:p>
-                  </a:txBody>
-                  <a:tcPr/>
-                </a:tc>
-                <a:extLst>
-                  <a:ext uri="{0D108BD9-81ED-4DB2-BD59-A6C34878D82A}">
-                    <a16:rowId xmlns:a16="http://schemas.microsoft.com/office/drawing/2014/main" val="2246135450"/>
-                  </a:ext>
-                </a:extLst>
-              </a:tr>
-              <a:tr h="414037">
-                <a:tc>
-                  <a:txBody>
-                    <a:bodyPr/>
-                    <a:lstStyle/>
-                    <a:p>
-                      <a:r>
-                        <a:rPr lang="en-US" dirty="0"/>
-                        <a:t>User 3</a:t>
-                      </a:r>
-                      <a:endParaRPr lang="en-CA" dirty="0"/>
-                    </a:p>
-                  </a:txBody>
-                  <a:tcPr/>
-                </a:tc>
-                <a:tc>
-                  <a:txBody>
-                    <a:bodyPr/>
-                    <a:lstStyle/>
-                    <a:p>
-                      <a:pPr algn="ctr"/>
-                      <a:r>
-                        <a:rPr lang="en-US" dirty="0"/>
-                        <a:t>5</a:t>
-                      </a:r>
-                      <a:endParaRPr lang="en-CA" dirty="0"/>
-                    </a:p>
-                  </a:txBody>
-                  <a:tcPr/>
+                  <a:tcPr>
+                    <a:solidFill>
+                      <a:srgbClr val="FFC000"/>
+                    </a:solidFill>
+                  </a:tcPr>
                 </a:tc>
                 <a:tc>
                   <a:txBody>
@@ -41269,7 +41236,11 @@
                       <a:endParaRPr lang="en-CA" dirty="0"/>
                     </a:p>
                   </a:txBody>
-                  <a:tcPr/>
+                  <a:tcPr>
+                    <a:solidFill>
+                      <a:srgbClr val="FFC000"/>
+                    </a:solidFill>
+                  </a:tcPr>
                 </a:tc>
                 <a:tc>
                   <a:txBody>
@@ -41279,12 +41250,113 @@
                       <a:pPr algn="ctr"/>
                       <a:r>
                         <a:rPr lang="en-US" dirty="0"/>
-                        <a:t>3</a:t>
+                        <a:t>1</a:t>
                       </a:r>
                       <a:endParaRPr lang="en-CA" dirty="0"/>
                     </a:p>
                   </a:txBody>
                   <a:tcPr/>
+                </a:tc>
+                <a:extLst>
+                  <a:ext uri="{0D108BD9-81ED-4DB2-BD59-A6C34878D82A}">
+                    <a16:rowId xmlns:a16="http://schemas.microsoft.com/office/drawing/2014/main" val="2246135450"/>
+                  </a:ext>
+                </a:extLst>
+              </a:tr>
+              <a:tr h="414037">
+                <a:tc>
+                  <a:txBody>
+                    <a:bodyPr/>
+                    <a:lstStyle/>
+                    <a:p>
+                      <a:r>
+                        <a:rPr lang="en-US" dirty="0"/>
+                        <a:t>User 3</a:t>
+                      </a:r>
+                      <a:endParaRPr lang="en-CA" dirty="0"/>
+                    </a:p>
+                  </a:txBody>
+                  <a:tcPr>
+                    <a:solidFill>
+                      <a:srgbClr val="FFC000"/>
+                    </a:solidFill>
+                  </a:tcPr>
+                </a:tc>
+                <a:tc>
+                  <a:txBody>
+                    <a:bodyPr/>
+                    <a:lstStyle/>
+                    <a:p>
+                      <a:pPr algn="ctr"/>
+                      <a:r>
+                        <a:rPr lang="en-US" dirty="0"/>
+                        <a:t>5</a:t>
+                      </a:r>
+                      <a:endParaRPr lang="en-CA" dirty="0"/>
+                    </a:p>
+                  </a:txBody>
+                  <a:tcPr>
+                    <a:solidFill>
+                      <a:srgbClr val="FFC000"/>
+                    </a:solidFill>
+                  </a:tcPr>
+                </a:tc>
+                <a:tc>
+                  <a:txBody>
+                    <a:bodyPr/>
+                    <a:lstStyle/>
+                    <a:p>
+                      <a:pPr algn="ctr"/>
+                      <a:r>
+                        <a:rPr lang="en-US" dirty="0"/>
+                        <a:t>4</a:t>
+                      </a:r>
+                      <a:endParaRPr lang="en-CA" dirty="0"/>
+                    </a:p>
+                  </a:txBody>
+                  <a:tcPr>
+                    <a:solidFill>
+                      <a:srgbClr val="FFC000"/>
+                    </a:solidFill>
+                  </a:tcPr>
+                </a:tc>
+                <a:tc>
+                  <a:txBody>
+                    <a:bodyPr/>
+                    <a:lstStyle/>
+                    <a:p>
+                      <a:pPr algn="ctr"/>
+                      <a:r>
+                        <a:rPr lang="en-US" dirty="0"/>
+                        <a:t>5</a:t>
+                      </a:r>
+                      <a:endParaRPr lang="en-CA" dirty="0"/>
+                    </a:p>
+                  </a:txBody>
+                  <a:tcPr>
+                    <a:solidFill>
+                      <a:srgbClr val="FFC000"/>
+                    </a:solidFill>
+                  </a:tcPr>
+                </a:tc>
+                <a:tc>
+                  <a:txBody>
+                    <a:bodyPr/>
+                    <a:lstStyle/>
+                    <a:p>
+                      <a:pPr algn="ctr"/>
+                      <a:r>
+                        <a:rPr lang="en-US" dirty="0"/>
+                        <a:t>4</a:t>
+                      </a:r>
+                      <a:endParaRPr lang="en-CA" dirty="0"/>
+                    </a:p>
+                  </a:txBody>
+                  <a:tcPr>
+                    <a:solidFill>
+                      <a:srgbClr val="FFC000"/>
+                    </a:solidFill>
+                  </a:tcPr>
                 </a:tc>
                 <a:extLst>
                   <a:ext uri="{0D108BD9-81ED-4DB2-BD59-A6C34878D82A}">
@@ -41315,7 +41387,26 @@
                       <a:pPr algn="ctr"/>
                       <a:r>
                         <a:rPr lang="en-US" dirty="0"/>
-                        <a:t>?</a:t>
+                        <a:t>4</a:t>
+                      </a:r>
+                      <a:endParaRPr lang="en-CA" dirty="0"/>
+                    </a:p>
+                  </a:txBody>
+                  <a:tcPr>
+                    <a:solidFill>
+                      <a:srgbClr val="FFC000"/>
+                    </a:solidFill>
+                  </a:tcPr>
+                </a:tc>
+                <a:tc>
+                  <a:txBody>
+                    <a:bodyPr/>
+                    <a:lstStyle/>
+                    <a:p>
+                      <a:pPr algn="ctr"/>
+                      <a:r>
+                        <a:rPr lang="en-US" dirty="0"/>
+                        <a:t>2.5</a:t>
                       </a:r>
                       <a:endParaRPr lang="en-CA" dirty="0"/>
                     </a:p>
@@ -41335,22 +41426,11 @@
                       <a:endParaRPr lang="en-CA" dirty="0"/>
                     </a:p>
                   </a:txBody>
-                  <a:tcPr/>
-                </a:tc>
-                <a:tc>
-                  <a:txBody>
-                    <a:bodyPr/>
-                    <a:lstStyle/>
-                    <a:p>
-                      <a:pPr algn="ctr"/>
-                      <a:r>
-                        <a:rPr lang="en-US" dirty="0"/>
-                        <a:t>?</a:t>
-                      </a:r>
-                      <a:endParaRPr lang="en-CA" dirty="0"/>
-                    </a:p>
-                  </a:txBody>
-                  <a:tcPr/>
+                  <a:tcPr>
+                    <a:solidFill>
+                      <a:srgbClr val="FFC000"/>
+                    </a:solidFill>
+                  </a:tcPr>
                 </a:tc>
                 <a:tc>
                   <a:txBody>
@@ -41379,108 +41459,6 @@
       </p:graphicFrame>
       <p:sp>
         <p:nvSpPr>
-          <p:cNvPr id="11" name="Oval 10">
-            <a:extLst>
-              <a:ext uri="{FF2B5EF4-FFF2-40B4-BE49-F238E27FC236}">
-                <a16:creationId xmlns:a16="http://schemas.microsoft.com/office/drawing/2014/main" id="{0A138626-03F9-43A7-8E8A-9970FA2CFBD5}"/>
-              </a:ext>
-            </a:extLst>
-          </p:cNvPr>
-          <p:cNvSpPr/>
-          <p:nvPr/>
-        </p:nvSpPr>
-        <p:spPr>
-          <a:xfrm>
-            <a:off x="3328009" y="2960458"/>
-            <a:ext cx="793102" cy="323077"/>
-          </a:xfrm>
-          <a:prstGeom prst="ellipse">
-            <a:avLst/>
-          </a:prstGeom>
-          <a:solidFill>
-            <a:schemeClr val="accent1">
-              <a:alpha val="34000"/>
-            </a:schemeClr>
-          </a:solidFill>
-        </p:spPr>
-        <p:style>
-          <a:lnRef idx="2">
-            <a:schemeClr val="accent1">
-              <a:shade val="50000"/>
-            </a:schemeClr>
-          </a:lnRef>
-          <a:fillRef idx="1">
-            <a:schemeClr val="accent1"/>
-          </a:fillRef>
-          <a:effectRef idx="0">
-            <a:schemeClr val="accent1"/>
-          </a:effectRef>
-          <a:fontRef idx="minor">
-            <a:schemeClr val="lt1"/>
-          </a:fontRef>
-        </p:style>
-        <p:txBody>
-          <a:bodyPr rtlCol="0" anchor="ctr"/>
-          <a:lstStyle/>
-          <a:p>
-            <a:pPr algn="ctr"/>
-            <a:endParaRPr lang="en-CA"/>
-          </a:p>
-        </p:txBody>
-      </p:sp>
-      <p:sp>
-        <p:nvSpPr>
-          <p:cNvPr id="12" name="Oval 11">
-            <a:extLst>
-              <a:ext uri="{FF2B5EF4-FFF2-40B4-BE49-F238E27FC236}">
-                <a16:creationId xmlns:a16="http://schemas.microsoft.com/office/drawing/2014/main" id="{D7167817-E380-4EA6-9B74-B355930F9245}"/>
-              </a:ext>
-            </a:extLst>
-          </p:cNvPr>
-          <p:cNvSpPr/>
-          <p:nvPr/>
-        </p:nvSpPr>
-        <p:spPr>
-          <a:xfrm>
-            <a:off x="4343619" y="1687982"/>
-            <a:ext cx="793102" cy="323077"/>
-          </a:xfrm>
-          <a:prstGeom prst="ellipse">
-            <a:avLst/>
-          </a:prstGeom>
-          <a:solidFill>
-            <a:schemeClr val="accent1">
-              <a:alpha val="34000"/>
-            </a:schemeClr>
-          </a:solidFill>
-        </p:spPr>
-        <p:style>
-          <a:lnRef idx="2">
-            <a:schemeClr val="accent1">
-              <a:shade val="50000"/>
-            </a:schemeClr>
-          </a:lnRef>
-          <a:fillRef idx="1">
-            <a:schemeClr val="accent1"/>
-          </a:fillRef>
-          <a:effectRef idx="0">
-            <a:schemeClr val="accent1"/>
-          </a:effectRef>
-          <a:fontRef idx="minor">
-            <a:schemeClr val="lt1"/>
-          </a:fontRef>
-        </p:style>
-        <p:txBody>
-          <a:bodyPr rtlCol="0" anchor="ctr"/>
-          <a:lstStyle/>
-          <a:p>
-            <a:pPr algn="ctr"/>
-            <a:endParaRPr lang="en-CA"/>
-          </a:p>
-        </p:txBody>
-      </p:sp>
-      <p:sp>
-        <p:nvSpPr>
           <p:cNvPr id="13" name="Oval 12">
             <a:extLst>
               <a:ext uri="{FF2B5EF4-FFF2-40B4-BE49-F238E27FC236}">
@@ -41494,57 +41472,6 @@
         <p:spPr>
           <a:xfrm>
             <a:off x="4355268" y="2960458"/>
-            <a:ext cx="793102" cy="323077"/>
-          </a:xfrm>
-          <a:prstGeom prst="ellipse">
-            <a:avLst/>
-          </a:prstGeom>
-          <a:solidFill>
-            <a:schemeClr val="accent1">
-              <a:alpha val="34000"/>
-            </a:schemeClr>
-          </a:solidFill>
-        </p:spPr>
-        <p:style>
-          <a:lnRef idx="2">
-            <a:schemeClr val="accent1">
-              <a:shade val="50000"/>
-            </a:schemeClr>
-          </a:lnRef>
-          <a:fillRef idx="1">
-            <a:schemeClr val="accent1"/>
-          </a:fillRef>
-          <a:effectRef idx="0">
-            <a:schemeClr val="accent1"/>
-          </a:effectRef>
-          <a:fontRef idx="minor">
-            <a:schemeClr val="lt1"/>
-          </a:fontRef>
-        </p:style>
-        <p:txBody>
-          <a:bodyPr rtlCol="0" anchor="ctr"/>
-          <a:lstStyle/>
-          <a:p>
-            <a:pPr algn="ctr"/>
-            <a:endParaRPr lang="en-CA"/>
-          </a:p>
-        </p:txBody>
-      </p:sp>
-      <p:sp>
-        <p:nvSpPr>
-          <p:cNvPr id="14" name="Oval 13">
-            <a:extLst>
-              <a:ext uri="{FF2B5EF4-FFF2-40B4-BE49-F238E27FC236}">
-                <a16:creationId xmlns:a16="http://schemas.microsoft.com/office/drawing/2014/main" id="{C07A53EB-9258-472D-916C-B30C04CFBBC1}"/>
-              </a:ext>
-            </a:extLst>
-          </p:cNvPr>
-          <p:cNvSpPr/>
-          <p:nvPr/>
-        </p:nvSpPr>
-        <p:spPr>
-          <a:xfrm>
-            <a:off x="1683123" y="2940372"/>
             <a:ext cx="793102" cy="323077"/>
           </a:xfrm>
           <a:prstGeom prst="ellipse">
@@ -41677,7 +41604,7 @@
         </p:nvSpPr>
         <p:spPr>
           <a:xfrm rot="5400000">
-            <a:off x="3559848" y="3704481"/>
+            <a:off x="3400508" y="3754569"/>
             <a:ext cx="849085" cy="718457"/>
           </a:xfrm>
           <a:prstGeom prst="rightArrow">
@@ -41728,14 +41655,14 @@
           <p:nvPr>
             <p:extLst>
               <p:ext uri="{D42A27DB-BD31-4B8C-83A1-F6EECF244321}">
-                <p14:modId xmlns:p14="http://schemas.microsoft.com/office/powerpoint/2010/main" val="1955832569"/>
+                <p14:modId xmlns:p14="http://schemas.microsoft.com/office/powerpoint/2010/main" val="1963631781"/>
               </p:ext>
             </p:extLst>
           </p:nvPr>
         </p:nvGraphicFramePr>
         <p:xfrm>
           <a:off x="6319253" y="1455577"/>
-          <a:ext cx="1409963" cy="2796720"/>
+          <a:ext cx="1409964" cy="2353513"/>
         </p:xfrm>
         <a:graphic>
           <a:graphicData uri="http://schemas.openxmlformats.org/drawingml/2006/table">
@@ -41744,14 +41671,21 @@
                 <a:tableStyleId>{5C22544A-7EE6-4342-B048-85BDC9FD1C3A}</a:tableStyleId>
               </a:tblPr>
               <a:tblGrid>
-                <a:gridCol w="477929">
+                <a:gridCol w="442274">
                   <a:extLst>
                     <a:ext uri="{9D8B030D-6E8A-4147-A177-3AD203B41FA5}">
                       <a16:colId xmlns:a16="http://schemas.microsoft.com/office/drawing/2014/main" val="3880138978"/>
                     </a:ext>
                   </a:extLst>
                 </a:gridCol>
-                <a:gridCol w="932034">
+                <a:gridCol w="406573">
+                  <a:extLst>
+                    <a:ext uri="{9D8B030D-6E8A-4147-A177-3AD203B41FA5}">
+                      <a16:colId xmlns:a16="http://schemas.microsoft.com/office/drawing/2014/main" val="3556327462"/>
+                    </a:ext>
+                  </a:extLst>
+                </a:gridCol>
+                <a:gridCol w="561117">
                   <a:extLst>
                     <a:ext uri="{9D8B030D-6E8A-4147-A177-3AD203B41FA5}">
                       <a16:colId xmlns:a16="http://schemas.microsoft.com/office/drawing/2014/main" val="2559725207"/>
@@ -41760,16 +41694,26 @@
                 </a:gridCol>
               </a:tblGrid>
               <a:tr h="471193">
-                <a:tc gridSpan="2">
+                <a:tc gridSpan="3">
                   <a:txBody>
                     <a:bodyPr/>
                     <a:lstStyle/>
                     <a:p>
                       <a:r>
-                        <a:rPr lang="en-US" dirty="0"/>
-                        <a:t>Matrix U –user specific</a:t>
+                        <a:rPr lang="en-US" sz="1200" dirty="0"/>
+                        <a:t>Matrix U –user (Action vs Rom)</a:t>
                       </a:r>
-                      <a:endParaRPr lang="en-CA" dirty="0"/>
+                      <a:endParaRPr lang="en-CA" sz="1200" dirty="0"/>
+                    </a:p>
+                  </a:txBody>
+                  <a:tcPr/>
+                </a:tc>
+                <a:tc hMerge="1">
+                  <a:txBody>
+                    <a:bodyPr/>
+                    <a:lstStyle/>
+                    <a:p>
+                      <a:endParaRPr lang="en-CA"/>
                     </a:p>
                   </a:txBody>
                   <a:tcPr/>
@@ -41796,7 +41740,11 @@
                     <a:bodyPr/>
                     <a:lstStyle/>
                     <a:p>
-                      <a:endParaRPr lang="en-CA"/>
+                      <a:r>
+                        <a:rPr lang="en-US" b="1" dirty="0"/>
+                        <a:t>1</a:t>
+                      </a:r>
+                      <a:endParaRPr lang="en-CA" b="1" dirty="0"/>
                     </a:p>
                   </a:txBody>
                   <a:tcPr/>
@@ -41806,7 +41754,25 @@
                     <a:bodyPr/>
                     <a:lstStyle/>
                     <a:p>
-                      <a:endParaRPr lang="en-CA"/>
+                      <a:r>
+                        <a:rPr lang="en-US" b="1" dirty="0"/>
+                        <a:t>Y</a:t>
+                      </a:r>
+                      <a:endParaRPr lang="en-CA" b="1" dirty="0"/>
+                    </a:p>
+                  </a:txBody>
+                  <a:tcPr/>
+                </a:tc>
+                <a:tc>
+                  <a:txBody>
+                    <a:bodyPr/>
+                    <a:lstStyle/>
+                    <a:p>
+                      <a:r>
+                        <a:rPr lang="en-US" b="1" dirty="0"/>
+                        <a:t>Y</a:t>
+                      </a:r>
+                      <a:endParaRPr lang="en-CA" b="1" dirty="0"/>
                     </a:p>
                   </a:txBody>
                   <a:tcPr/>
@@ -41823,7 +41789,11 @@
                     <a:bodyPr/>
                     <a:lstStyle/>
                     <a:p>
-                      <a:endParaRPr lang="en-CA"/>
+                      <a:r>
+                        <a:rPr lang="en-US" dirty="0"/>
+                        <a:t>2</a:t>
+                      </a:r>
+                      <a:endParaRPr lang="en-CA" dirty="0"/>
                     </a:p>
                   </a:txBody>
                   <a:tcPr/>
@@ -41833,7 +41803,25 @@
                     <a:bodyPr/>
                     <a:lstStyle/>
                     <a:p>
-                      <a:endParaRPr lang="en-CA"/>
+                      <a:r>
+                        <a:rPr lang="en-US" dirty="0"/>
+                        <a:t>N</a:t>
+                      </a:r>
+                      <a:endParaRPr lang="en-CA" dirty="0"/>
+                    </a:p>
+                  </a:txBody>
+                  <a:tcPr/>
+                </a:tc>
+                <a:tc>
+                  <a:txBody>
+                    <a:bodyPr/>
+                    <a:lstStyle/>
+                    <a:p>
+                      <a:r>
+                        <a:rPr lang="en-US" dirty="0"/>
+                        <a:t>Y</a:t>
+                      </a:r>
+                      <a:endParaRPr lang="en-CA" dirty="0"/>
                     </a:p>
                   </a:txBody>
                   <a:tcPr/>
@@ -41850,7 +41838,11 @@
                     <a:bodyPr/>
                     <a:lstStyle/>
                     <a:p>
-                      <a:endParaRPr lang="en-CA"/>
+                      <a:r>
+                        <a:rPr lang="en-US" b="1" dirty="0"/>
+                        <a:t>3</a:t>
+                      </a:r>
+                      <a:endParaRPr lang="en-CA" b="1" dirty="0"/>
                     </a:p>
                   </a:txBody>
                   <a:tcPr/>
@@ -41860,7 +41852,25 @@
                     <a:bodyPr/>
                     <a:lstStyle/>
                     <a:p>
-                      <a:endParaRPr lang="en-CA"/>
+                      <a:r>
+                        <a:rPr lang="en-US" b="1" dirty="0"/>
+                        <a:t>Y</a:t>
+                      </a:r>
+                      <a:endParaRPr lang="en-CA" b="1" dirty="0"/>
+                    </a:p>
+                  </a:txBody>
+                  <a:tcPr/>
+                </a:tc>
+                <a:tc>
+                  <a:txBody>
+                    <a:bodyPr/>
+                    <a:lstStyle/>
+                    <a:p>
+                      <a:r>
+                        <a:rPr lang="en-US" b="1" dirty="0"/>
+                        <a:t>Y</a:t>
+                      </a:r>
+                      <a:endParaRPr lang="en-CA" b="1" dirty="0"/>
                     </a:p>
                   </a:txBody>
                   <a:tcPr/>
@@ -41877,7 +41887,11 @@
                     <a:bodyPr/>
                     <a:lstStyle/>
                     <a:p>
-                      <a:endParaRPr lang="en-CA"/>
+                      <a:r>
+                        <a:rPr lang="en-US" sz="1200" dirty="0"/>
+                        <a:t>1m</a:t>
+                      </a:r>
+                      <a:endParaRPr lang="en-CA" sz="1200" dirty="0"/>
                     </a:p>
                   </a:txBody>
                   <a:tcPr/>
@@ -41887,6 +41901,24 @@
                     <a:bodyPr/>
                     <a:lstStyle/>
                     <a:p>
+                      <a:r>
+                        <a:rPr lang="en-US" dirty="0"/>
+                        <a:t>Y</a:t>
+                      </a:r>
+                      <a:endParaRPr lang="en-CA" dirty="0"/>
+                    </a:p>
+                  </a:txBody>
+                  <a:tcPr/>
+                </a:tc>
+                <a:tc>
+                  <a:txBody>
+                    <a:bodyPr/>
+                    <a:lstStyle/>
+                    <a:p>
+                      <a:r>
+                        <a:rPr lang="en-US" dirty="0"/>
+                        <a:t>Y</a:t>
+                      </a:r>
                       <a:endParaRPr lang="en-CA" dirty="0"/>
                     </a:p>
                   </a:txBody>
@@ -41917,13 +41949,13 @@
           <p:nvPr>
             <p:extLst>
               <p:ext uri="{D42A27DB-BD31-4B8C-83A1-F6EECF244321}">
-                <p14:modId xmlns:p14="http://schemas.microsoft.com/office/powerpoint/2010/main" val="3123930630"/>
+                <p14:modId xmlns:p14="http://schemas.microsoft.com/office/powerpoint/2010/main" val="3611128852"/>
               </p:ext>
             </p:extLst>
           </p:nvPr>
         </p:nvGraphicFramePr>
         <p:xfrm>
-          <a:off x="7862951" y="2330808"/>
+          <a:off x="7810576" y="2672469"/>
           <a:ext cx="3932648" cy="1478280"/>
         </p:xfrm>
         <a:graphic>
@@ -41970,7 +42002,7 @@
                     <a:p>
                       <a:r>
                         <a:rPr lang="en-US" dirty="0"/>
-                        <a:t>Matrix V – rating specific</a:t>
+                        <a:t>Matrix V – rating prediction </a:t>
                       </a:r>
                       <a:endParaRPr lang="en-CA" dirty="0"/>
                     </a:p>
@@ -42019,7 +42051,11 @@
                     <a:bodyPr/>
                     <a:lstStyle/>
                     <a:p>
-                      <a:endParaRPr lang="en-CA"/>
+                      <a:r>
+                        <a:rPr lang="en-US" dirty="0"/>
+                        <a:t>User 1</a:t>
+                      </a:r>
+                      <a:endParaRPr lang="en-CA" dirty="0"/>
                     </a:p>
                   </a:txBody>
                   <a:tcPr/>
@@ -42029,7 +42065,11 @@
                     <a:bodyPr/>
                     <a:lstStyle/>
                     <a:p>
-                      <a:endParaRPr lang="en-CA"/>
+                      <a:r>
+                        <a:rPr lang="en-US" dirty="0"/>
+                        <a:t>5</a:t>
+                      </a:r>
+                      <a:endParaRPr lang="en-CA" dirty="0"/>
                     </a:p>
                   </a:txBody>
                   <a:tcPr/>
@@ -42039,7 +42079,11 @@
                     <a:bodyPr/>
                     <a:lstStyle/>
                     <a:p>
-                      <a:endParaRPr lang="en-CA"/>
+                      <a:r>
+                        <a:rPr lang="en-US" dirty="0"/>
+                        <a:t>5</a:t>
+                      </a:r>
+                      <a:endParaRPr lang="en-CA" dirty="0"/>
                     </a:p>
                   </a:txBody>
                   <a:tcPr/>
@@ -42049,6 +42093,10 @@
                     <a:bodyPr/>
                     <a:lstStyle/>
                     <a:p>
+                      <a:r>
+                        <a:rPr lang="en-US" dirty="0"/>
+                        <a:t>5</a:t>
+                      </a:r>
                       <a:endParaRPr lang="en-CA" dirty="0"/>
                     </a:p>
                   </a:txBody>
@@ -42066,7 +42114,11 @@
                     <a:bodyPr/>
                     <a:lstStyle/>
                     <a:p>
-                      <a:endParaRPr lang="en-CA"/>
+                      <a:r>
+                        <a:rPr lang="en-US" dirty="0"/>
+                        <a:t>User 2</a:t>
+                      </a:r>
+                      <a:endParaRPr lang="en-CA" dirty="0"/>
                     </a:p>
                   </a:txBody>
                   <a:tcPr/>
@@ -42076,7 +42128,11 @@
                     <a:bodyPr/>
                     <a:lstStyle/>
                     <a:p>
-                      <a:endParaRPr lang="en-CA"/>
+                      <a:r>
+                        <a:rPr lang="en-US" dirty="0"/>
+                        <a:t>2</a:t>
+                      </a:r>
+                      <a:endParaRPr lang="en-CA" dirty="0"/>
                     </a:p>
                   </a:txBody>
                   <a:tcPr/>
@@ -42086,7 +42142,19 @@
                     <a:bodyPr/>
                     <a:lstStyle/>
                     <a:p>
-                      <a:endParaRPr lang="en-CA"/>
+                      <a:r>
+                        <a:rPr lang="en-US" dirty="0">
+                          <a:highlight>
+                            <a:srgbClr val="FFFF00"/>
+                          </a:highlight>
+                        </a:rPr>
+                        <a:t>1</a:t>
+                      </a:r>
+                      <a:endParaRPr lang="en-CA" dirty="0">
+                        <a:highlight>
+                          <a:srgbClr val="FFFF00"/>
+                        </a:highlight>
+                      </a:endParaRPr>
                     </a:p>
                   </a:txBody>
                   <a:tcPr/>
@@ -42096,7 +42164,11 @@
                     <a:bodyPr/>
                     <a:lstStyle/>
                     <a:p>
-                      <a:endParaRPr lang="en-CA"/>
+                      <a:r>
+                        <a:rPr lang="en-US" dirty="0"/>
+                        <a:t>2</a:t>
+                      </a:r>
+                      <a:endParaRPr lang="en-CA" dirty="0"/>
                     </a:p>
                   </a:txBody>
                   <a:tcPr/>
@@ -42113,7 +42185,11 @@
                     <a:bodyPr/>
                     <a:lstStyle/>
                     <a:p>
-                      <a:endParaRPr lang="en-CA"/>
+                      <a:r>
+                        <a:rPr lang="en-US" dirty="0"/>
+                        <a:t>User 3</a:t>
+                      </a:r>
+                      <a:endParaRPr lang="en-CA" dirty="0"/>
                     </a:p>
                   </a:txBody>
                   <a:tcPr/>
@@ -42123,7 +42199,11 @@
                     <a:bodyPr/>
                     <a:lstStyle/>
                     <a:p>
-                      <a:endParaRPr lang="en-CA"/>
+                      <a:r>
+                        <a:rPr lang="en-US" dirty="0"/>
+                        <a:t>5</a:t>
+                      </a:r>
+                      <a:endParaRPr lang="en-CA" dirty="0"/>
                     </a:p>
                   </a:txBody>
                   <a:tcPr/>
@@ -42133,7 +42213,19 @@
                     <a:bodyPr/>
                     <a:lstStyle/>
                     <a:p>
-                      <a:endParaRPr lang="en-CA"/>
+                      <a:r>
+                        <a:rPr lang="en-US" dirty="0">
+                          <a:highlight>
+                            <a:srgbClr val="FFFF00"/>
+                          </a:highlight>
+                        </a:rPr>
+                        <a:t>5</a:t>
+                      </a:r>
+                      <a:endParaRPr lang="en-CA" dirty="0">
+                        <a:highlight>
+                          <a:srgbClr val="FFFF00"/>
+                        </a:highlight>
+                      </a:endParaRPr>
                     </a:p>
                   </a:txBody>
                   <a:tcPr/>
@@ -42143,6 +42235,10 @@
                     <a:bodyPr/>
                     <a:lstStyle/>
                     <a:p>
+                      <a:r>
+                        <a:rPr lang="en-US" dirty="0"/>
+                        <a:t>5</a:t>
+                      </a:r>
                       <a:endParaRPr lang="en-CA" dirty="0"/>
                     </a:p>
                   </a:txBody>
@@ -42173,14 +42269,14 @@
           <p:nvPr>
             <p:extLst>
               <p:ext uri="{D42A27DB-BD31-4B8C-83A1-F6EECF244321}">
-                <p14:modId xmlns:p14="http://schemas.microsoft.com/office/powerpoint/2010/main" val="2024834383"/>
+                <p14:modId xmlns:p14="http://schemas.microsoft.com/office/powerpoint/2010/main" val="3037898025"/>
               </p:ext>
             </p:extLst>
           </p:nvPr>
         </p:nvGraphicFramePr>
         <p:xfrm>
-          <a:off x="7814594" y="1457966"/>
-          <a:ext cx="3981004" cy="741680"/>
+          <a:off x="7810576" y="1289176"/>
+          <a:ext cx="3769828" cy="1280160"/>
         </p:xfrm>
         <a:graphic>
           <a:graphicData uri="http://schemas.openxmlformats.org/drawingml/2006/table">
@@ -42189,28 +42285,28 @@
                 <a:tableStyleId>{5C22544A-7EE6-4342-B048-85BDC9FD1C3A}</a:tableStyleId>
               </a:tblPr>
               <a:tblGrid>
-                <a:gridCol w="995251">
+                <a:gridCol w="942457">
                   <a:extLst>
                     <a:ext uri="{9D8B030D-6E8A-4147-A177-3AD203B41FA5}">
                       <a16:colId xmlns:a16="http://schemas.microsoft.com/office/drawing/2014/main" val="1040936274"/>
                     </a:ext>
                   </a:extLst>
                 </a:gridCol>
-                <a:gridCol w="995251">
+                <a:gridCol w="942457">
                   <a:extLst>
                     <a:ext uri="{9D8B030D-6E8A-4147-A177-3AD203B41FA5}">
                       <a16:colId xmlns:a16="http://schemas.microsoft.com/office/drawing/2014/main" val="3664975152"/>
                     </a:ext>
                   </a:extLst>
                 </a:gridCol>
-                <a:gridCol w="995251">
+                <a:gridCol w="942457">
                   <a:extLst>
                     <a:ext uri="{9D8B030D-6E8A-4147-A177-3AD203B41FA5}">
                       <a16:colId xmlns:a16="http://schemas.microsoft.com/office/drawing/2014/main" val="4148756376"/>
                     </a:ext>
                   </a:extLst>
                 </a:gridCol>
-                <a:gridCol w="995251">
+                <a:gridCol w="942457">
                   <a:extLst>
                     <a:ext uri="{9D8B030D-6E8A-4147-A177-3AD203B41FA5}">
                       <a16:colId xmlns:a16="http://schemas.microsoft.com/office/drawing/2014/main" val="3370635549"/>
@@ -42218,17 +42314,17 @@
                   </a:extLst>
                 </a:gridCol>
               </a:tblGrid>
-              <a:tr h="370840">
+              <a:tr h="250298">
                 <a:tc gridSpan="4">
                   <a:txBody>
                     <a:bodyPr/>
                     <a:lstStyle/>
                     <a:p>
                       <a:r>
-                        <a:rPr lang="en-US" dirty="0"/>
+                        <a:rPr lang="en-US" sz="1400" dirty="0"/>
                         <a:t>Matrix W –movie specific</a:t>
                       </a:r>
-                      <a:endParaRPr lang="en-CA" dirty="0"/>
+                      <a:endParaRPr lang="en-CA" sz="1400" dirty="0"/>
                     </a:p>
                   </a:txBody>
                   <a:tcPr/>
@@ -42269,37 +42365,7 @@
                   </a:ext>
                 </a:extLst>
               </a:tr>
-              <a:tr h="370840">
-                <a:tc>
-                  <a:txBody>
-                    <a:bodyPr/>
-                    <a:lstStyle/>
-                    <a:p>
-                      <a:endParaRPr lang="en-CA"/>
-                    </a:p>
-                  </a:txBody>
-                  <a:tcPr/>
-                </a:tc>
-                <a:tc>
-                  <a:txBody>
-                    <a:bodyPr/>
-                    <a:lstStyle/>
-                    <a:p>
-                      <a:endParaRPr lang="en-CA"/>
-                    </a:p>
-                  </a:txBody>
-                  <a:tcPr/>
-                </a:tc>
-                <a:tc>
-                  <a:txBody>
-                    <a:bodyPr/>
-                    <a:lstStyle/>
-                    <a:p>
-                      <a:endParaRPr lang="en-CA"/>
-                    </a:p>
-                  </a:txBody>
-                  <a:tcPr/>
-                </a:tc>
+              <a:tr h="300358">
                 <a:tc>
                   <a:txBody>
                     <a:bodyPr/>
@@ -42310,9 +42376,185 @@
                   </a:txBody>
                   <a:tcPr/>
                 </a:tc>
+                <a:tc>
+                  <a:txBody>
+                    <a:bodyPr/>
+                    <a:lstStyle/>
+                    <a:p>
+                      <a:r>
+                        <a:rPr lang="en-US" sz="1100" dirty="0" err="1"/>
+                        <a:t>BankJob</a:t>
+                      </a:r>
+                      <a:endParaRPr lang="en-CA" sz="1100" dirty="0"/>
+                    </a:p>
+                  </a:txBody>
+                  <a:tcPr/>
+                </a:tc>
+                <a:tc>
+                  <a:txBody>
+                    <a:bodyPr/>
+                    <a:lstStyle/>
+                    <a:p>
+                      <a:r>
+                        <a:rPr lang="en-US" sz="1100" dirty="0" err="1"/>
+                        <a:t>Baasha</a:t>
+                      </a:r>
+                      <a:endParaRPr lang="en-CA" sz="1100" dirty="0"/>
+                    </a:p>
+                  </a:txBody>
+                  <a:tcPr/>
+                </a:tc>
+                <a:tc>
+                  <a:txBody>
+                    <a:bodyPr/>
+                    <a:lstStyle/>
+                    <a:p>
+                      <a:r>
+                        <a:rPr lang="en-US" sz="1100" dirty="0"/>
+                        <a:t>Godfather</a:t>
+                      </a:r>
+                      <a:endParaRPr lang="en-CA" sz="1100" dirty="0"/>
+                    </a:p>
+                  </a:txBody>
+                  <a:tcPr/>
+                </a:tc>
                 <a:extLst>
                   <a:ext uri="{0D108BD9-81ED-4DB2-BD59-A6C34878D82A}">
                     <a16:rowId xmlns:a16="http://schemas.microsoft.com/office/drawing/2014/main" val="3858881286"/>
+                  </a:ext>
+                </a:extLst>
+              </a:tr>
+              <a:tr h="300358">
+                <a:tc>
+                  <a:txBody>
+                    <a:bodyPr/>
+                    <a:lstStyle/>
+                    <a:p>
+                      <a:pPr algn="ctr"/>
+                      <a:r>
+                        <a:rPr lang="en-US" sz="1400" dirty="0"/>
+                        <a:t>Action</a:t>
+                      </a:r>
+                      <a:endParaRPr lang="en-CA" sz="1400" dirty="0"/>
+                    </a:p>
+                  </a:txBody>
+                  <a:tcPr/>
+                </a:tc>
+                <a:tc>
+                  <a:txBody>
+                    <a:bodyPr/>
+                    <a:lstStyle/>
+                    <a:p>
+                      <a:pPr algn="ctr"/>
+                      <a:r>
+                        <a:rPr lang="en-US" sz="1400" b="1" dirty="0"/>
+                        <a:t>3</a:t>
+                      </a:r>
+                      <a:endParaRPr lang="en-CA" sz="1400" b="1" dirty="0"/>
+                    </a:p>
+                  </a:txBody>
+                  <a:tcPr/>
+                </a:tc>
+                <a:tc>
+                  <a:txBody>
+                    <a:bodyPr/>
+                    <a:lstStyle/>
+                    <a:p>
+                      <a:pPr algn="ctr"/>
+                      <a:r>
+                        <a:rPr lang="en-US" sz="1400" dirty="0"/>
+                        <a:t>4</a:t>
+                      </a:r>
+                      <a:endParaRPr lang="en-CA" sz="1400" dirty="0"/>
+                    </a:p>
+                  </a:txBody>
+                  <a:tcPr/>
+                </a:tc>
+                <a:tc>
+                  <a:txBody>
+                    <a:bodyPr/>
+                    <a:lstStyle/>
+                    <a:p>
+                      <a:pPr algn="ctr"/>
+                      <a:r>
+                        <a:rPr lang="en-US" sz="1400" b="1" dirty="0"/>
+                        <a:t>3</a:t>
+                      </a:r>
+                      <a:endParaRPr lang="en-CA" sz="1400" b="1" dirty="0"/>
+                    </a:p>
+                  </a:txBody>
+                  <a:tcPr/>
+                </a:tc>
+                <a:extLst>
+                  <a:ext uri="{0D108BD9-81ED-4DB2-BD59-A6C34878D82A}">
+                    <a16:rowId xmlns:a16="http://schemas.microsoft.com/office/drawing/2014/main" val="3448950472"/>
+                  </a:ext>
+                </a:extLst>
+              </a:tr>
+              <a:tr h="300358">
+                <a:tc>
+                  <a:txBody>
+                    <a:bodyPr/>
+                    <a:lstStyle/>
+                    <a:p>
+                      <a:pPr algn="ctr"/>
+                      <a:r>
+                        <a:rPr lang="en-US" sz="1400" dirty="0"/>
+                        <a:t>Rom</a:t>
+                      </a:r>
+                      <a:endParaRPr lang="en-CA" sz="1400" dirty="0"/>
+                    </a:p>
+                  </a:txBody>
+                  <a:tcPr/>
+                </a:tc>
+                <a:tc>
+                  <a:txBody>
+                    <a:bodyPr/>
+                    <a:lstStyle/>
+                    <a:p>
+                      <a:pPr algn="ctr"/>
+                      <a:r>
+                        <a:rPr lang="en-US" sz="1400" b="1" dirty="0"/>
+                        <a:t>2</a:t>
+                      </a:r>
+                      <a:endParaRPr lang="en-CA" sz="1400" b="1" dirty="0"/>
+                    </a:p>
+                  </a:txBody>
+                  <a:tcPr/>
+                </a:tc>
+                <a:tc>
+                  <a:txBody>
+                    <a:bodyPr/>
+                    <a:lstStyle/>
+                    <a:p>
+                      <a:pPr algn="ctr"/>
+                      <a:r>
+                        <a:rPr lang="en-US" sz="1400" dirty="0"/>
+                        <a:t>1</a:t>
+                      </a:r>
+                      <a:endParaRPr lang="en-CA" sz="1400" dirty="0"/>
+                    </a:p>
+                  </a:txBody>
+                  <a:tcPr/>
+                </a:tc>
+                <a:tc>
+                  <a:txBody>
+                    <a:bodyPr/>
+                    <a:lstStyle/>
+                    <a:p>
+                      <a:pPr algn="ctr"/>
+                      <a:r>
+                        <a:rPr lang="en-US" sz="1400" b="1" dirty="0"/>
+                        <a:t>2</a:t>
+                      </a:r>
+                      <a:endParaRPr lang="en-CA" sz="1400" b="1" dirty="0"/>
+                    </a:p>
+                  </a:txBody>
+                  <a:tcPr/>
+                </a:tc>
+                <a:extLst>
+                  <a:ext uri="{0D108BD9-81ED-4DB2-BD59-A6C34878D82A}">
+                    <a16:rowId xmlns:a16="http://schemas.microsoft.com/office/drawing/2014/main" val="3762561358"/>
                   </a:ext>
                 </a:extLst>
               </a:tr>
@@ -42320,57 +42562,6 @@
           </a:graphicData>
         </a:graphic>
       </p:graphicFrame>
-      <p:sp>
-        <p:nvSpPr>
-          <p:cNvPr id="21" name="Oval 20">
-            <a:extLst>
-              <a:ext uri="{FF2B5EF4-FFF2-40B4-BE49-F238E27FC236}">
-                <a16:creationId xmlns:a16="http://schemas.microsoft.com/office/drawing/2014/main" id="{FF03B667-DB14-4D01-B62C-B31E4759C141}"/>
-              </a:ext>
-            </a:extLst>
-          </p:cNvPr>
-          <p:cNvSpPr/>
-          <p:nvPr/>
-        </p:nvSpPr>
-        <p:spPr>
-          <a:xfrm>
-            <a:off x="4355268" y="2165348"/>
-            <a:ext cx="793102" cy="323077"/>
-          </a:xfrm>
-          <a:prstGeom prst="ellipse">
-            <a:avLst/>
-          </a:prstGeom>
-          <a:solidFill>
-            <a:schemeClr val="accent1">
-              <a:alpha val="34000"/>
-            </a:schemeClr>
-          </a:solidFill>
-        </p:spPr>
-        <p:style>
-          <a:lnRef idx="2">
-            <a:schemeClr val="accent1">
-              <a:shade val="50000"/>
-            </a:schemeClr>
-          </a:lnRef>
-          <a:fillRef idx="1">
-            <a:schemeClr val="accent1"/>
-          </a:fillRef>
-          <a:effectRef idx="0">
-            <a:schemeClr val="accent1"/>
-          </a:effectRef>
-          <a:fontRef idx="minor">
-            <a:schemeClr val="lt1"/>
-          </a:fontRef>
-        </p:style>
-        <p:txBody>
-          <a:bodyPr rtlCol="0" anchor="ctr"/>
-          <a:lstStyle/>
-          <a:p>
-            <a:pPr algn="ctr"/>
-            <a:endParaRPr lang="en-CA"/>
-          </a:p>
-        </p:txBody>
-      </p:sp>
       <p:sp>
         <p:nvSpPr>
           <p:cNvPr id="22" name="TextBox 21">
@@ -42502,7 +42693,7 @@
         </p:nvSpPr>
         <p:spPr>
           <a:xfrm>
-            <a:off x="8225429" y="4049200"/>
+            <a:off x="8225429" y="4222651"/>
             <a:ext cx="3000839" cy="461665"/>
           </a:xfrm>
           <a:prstGeom prst="rect">
@@ -42587,7 +42778,7 @@
         </p:nvSpPr>
         <p:spPr>
           <a:xfrm>
-            <a:off x="4121111" y="431069"/>
+            <a:off x="4131554" y="440596"/>
             <a:ext cx="7448848" cy="830997"/>
           </a:xfrm>
           <a:prstGeom prst="rect">
@@ -43617,6 +43808,15 @@
 </file>
 
 <file path=customXml/item2.xml><?xml version="1.0" encoding="utf-8"?>
+<p:properties xmlns:p="http://schemas.microsoft.com/office/2006/metadata/properties" xmlns:xsi="http://www.w3.org/2001/XMLSchema-instance" xmlns:pc="http://schemas.microsoft.com/office/infopath/2007/PartnerControls">
+  <documentManagement>
+    <Status xmlns="71af3243-3dd4-4a8d-8c0d-dd76da1f02a5">Not started</Status>
+    <MediaServiceKeyPoints xmlns="71af3243-3dd4-4a8d-8c0d-dd76da1f02a5" xsi:nil="true"/>
+  </documentManagement>
+</p:properties>
+</file>
+
+<file path=customXml/item3.xml><?xml version="1.0" encoding="utf-8"?>
 <ct:contentTypeSchema xmlns:ct="http://schemas.microsoft.com/office/2006/metadata/contentType" xmlns:ma="http://schemas.microsoft.com/office/2006/metadata/properties/metaAttributes" ct:_="" ma:_="" ma:contentTypeName="Document" ma:contentTypeID="0x01010079F111ED35F8CC479449609E8A0923A6" ma:contentTypeVersion="12" ma:contentTypeDescription="Create a new document." ma:contentTypeScope="" ma:versionID="a410dd7f93c95333ffa1b60ed6adedd1">
   <xsd:schema xmlns:xsd="http://www.w3.org/2001/XMLSchema" xmlns:xs="http://www.w3.org/2001/XMLSchema" xmlns:p="http://schemas.microsoft.com/office/2006/metadata/properties" xmlns:ns2="71af3243-3dd4-4a8d-8c0d-dd76da1f02a5" xmlns:ns3="16c05727-aa75-4e4a-9b5f-8a80a1165891" targetNamespace="http://schemas.microsoft.com/office/2006/metadata/properties" ma:root="true" ma:fieldsID="a936d9baba76aa3866493feff160faab" ns2:_="" ns3:_="">
     <xsd:import namespace="71af3243-3dd4-4a8d-8c0d-dd76da1f02a5"/>
@@ -43837,15 +44037,6 @@
 </ct:contentTypeSchema>
 </file>
 
-<file path=customXml/item3.xml><?xml version="1.0" encoding="utf-8"?>
-<p:properties xmlns:p="http://schemas.microsoft.com/office/2006/metadata/properties" xmlns:xsi="http://www.w3.org/2001/XMLSchema-instance" xmlns:pc="http://schemas.microsoft.com/office/infopath/2007/PartnerControls">
-  <documentManagement>
-    <Status xmlns="71af3243-3dd4-4a8d-8c0d-dd76da1f02a5">Not started</Status>
-    <MediaServiceKeyPoints xmlns="71af3243-3dd4-4a8d-8c0d-dd76da1f02a5" xsi:nil="true"/>
-  </documentManagement>
-</p:properties>
-</file>
-
 <file path=customXml/itemProps1.xml><?xml version="1.0" encoding="utf-8"?>
 <ds:datastoreItem xmlns:ds="http://schemas.openxmlformats.org/officeDocument/2006/customXml" ds:itemID="{7745B92C-4D89-4324-B52D-E1F5F627B790}">
   <ds:schemaRefs>
@@ -43855,6 +44046,16 @@
 </file>
 
 <file path=customXml/itemProps2.xml><?xml version="1.0" encoding="utf-8"?>
+<ds:datastoreItem xmlns:ds="http://schemas.openxmlformats.org/officeDocument/2006/customXml" ds:itemID="{E7228C0C-F774-4270-99CB-314B07EBFBE7}">
+  <ds:schemaRefs>
+    <ds:schemaRef ds:uri="http://schemas.microsoft.com/office/2006/metadata/properties"/>
+    <ds:schemaRef ds:uri="http://schemas.microsoft.com/office/infopath/2007/PartnerControls"/>
+    <ds:schemaRef ds:uri="71af3243-3dd4-4a8d-8c0d-dd76da1f02a5"/>
+  </ds:schemaRefs>
+</ds:datastoreItem>
+</file>
+
+<file path=customXml/itemProps3.xml><?xml version="1.0" encoding="utf-8"?>
 <ds:datastoreItem xmlns:ds="http://schemas.openxmlformats.org/officeDocument/2006/customXml" ds:itemID="{E4487CEA-7875-4327-875F-CA3B32E8009E}">
   <ds:schemaRefs>
     <ds:schemaRef ds:uri="http://schemas.microsoft.com/office/2006/metadata/contentType"/>
@@ -43871,14 +44072,4 @@
     <ds:schemaRef ds:uri="http://schemas.microsoft.com/internal/obd"/>
   </ds:schemaRefs>
 </ds:datastoreItem>
-</file>
-
-<file path=customXml/itemProps3.xml><?xml version="1.0" encoding="utf-8"?>
-<ds:datastoreItem xmlns:ds="http://schemas.openxmlformats.org/officeDocument/2006/customXml" ds:itemID="{E7228C0C-F774-4270-99CB-314B07EBFBE7}">
-  <ds:schemaRefs>
-    <ds:schemaRef ds:uri="http://schemas.microsoft.com/office/2006/metadata/properties"/>
-    <ds:schemaRef ds:uri="http://schemas.microsoft.com/office/infopath/2007/PartnerControls"/>
-    <ds:schemaRef ds:uri="71af3243-3dd4-4a8d-8c0d-dd76da1f02a5"/>
-  </ds:schemaRefs>
-</ds:datastoreItem>
 </file>
</xml_diff>